<commit_message>
fix: changed template to A4
</commit_message>
<xml_diff>
--- a/inst/ppt/template.pptx
+++ b/inst/ppt/template.pptx
@@ -7,7 +7,7 @@
   <p:sldIdLst>
     <p:sldId id="256" r:id="rId2"/>
   </p:sldIdLst>
-  <p:sldSz cx="9601200" cy="12801600" type="A3"/>
+  <p:sldSz cx="6858000" cy="9906000" type="A4"/>
   <p:notesSz cx="6858000" cy="9144000"/>
   <p:custDataLst>
     <p:tags r:id="rId3"/>
@@ -16,8 +16,8 @@
     <a:defPPr>
       <a:defRPr lang="en-US"/>
     </a:defPPr>
-    <a:lvl1pPr marL="0" algn="l" defTabSz="1280160" rtl="0" eaLnBrk="1" latinLnBrk="0" hangingPunct="1">
-      <a:defRPr sz="2520" kern="1200">
+    <a:lvl1pPr marL="0" algn="l" defTabSz="957816" rtl="0" eaLnBrk="1" latinLnBrk="0" hangingPunct="1">
+      <a:defRPr sz="1885" kern="1200">
         <a:solidFill>
           <a:schemeClr val="tx1"/>
         </a:solidFill>
@@ -26,8 +26,8 @@
         <a:cs typeface="+mn-cs"/>
       </a:defRPr>
     </a:lvl1pPr>
-    <a:lvl2pPr marL="640080" algn="l" defTabSz="1280160" rtl="0" eaLnBrk="1" latinLnBrk="0" hangingPunct="1">
-      <a:defRPr sz="2520" kern="1200">
+    <a:lvl2pPr marL="478908" algn="l" defTabSz="957816" rtl="0" eaLnBrk="1" latinLnBrk="0" hangingPunct="1">
+      <a:defRPr sz="1885" kern="1200">
         <a:solidFill>
           <a:schemeClr val="tx1"/>
         </a:solidFill>
@@ -36,8 +36,8 @@
         <a:cs typeface="+mn-cs"/>
       </a:defRPr>
     </a:lvl2pPr>
-    <a:lvl3pPr marL="1280160" algn="l" defTabSz="1280160" rtl="0" eaLnBrk="1" latinLnBrk="0" hangingPunct="1">
-      <a:defRPr sz="2520" kern="1200">
+    <a:lvl3pPr marL="957816" algn="l" defTabSz="957816" rtl="0" eaLnBrk="1" latinLnBrk="0" hangingPunct="1">
+      <a:defRPr sz="1885" kern="1200">
         <a:solidFill>
           <a:schemeClr val="tx1"/>
         </a:solidFill>
@@ -46,8 +46,8 @@
         <a:cs typeface="+mn-cs"/>
       </a:defRPr>
     </a:lvl3pPr>
-    <a:lvl4pPr marL="1920240" algn="l" defTabSz="1280160" rtl="0" eaLnBrk="1" latinLnBrk="0" hangingPunct="1">
-      <a:defRPr sz="2520" kern="1200">
+    <a:lvl4pPr marL="1436724" algn="l" defTabSz="957816" rtl="0" eaLnBrk="1" latinLnBrk="0" hangingPunct="1">
+      <a:defRPr sz="1885" kern="1200">
         <a:solidFill>
           <a:schemeClr val="tx1"/>
         </a:solidFill>
@@ -56,8 +56,8 @@
         <a:cs typeface="+mn-cs"/>
       </a:defRPr>
     </a:lvl4pPr>
-    <a:lvl5pPr marL="2560320" algn="l" defTabSz="1280160" rtl="0" eaLnBrk="1" latinLnBrk="0" hangingPunct="1">
-      <a:defRPr sz="2520" kern="1200">
+    <a:lvl5pPr marL="1915631" algn="l" defTabSz="957816" rtl="0" eaLnBrk="1" latinLnBrk="0" hangingPunct="1">
+      <a:defRPr sz="1885" kern="1200">
         <a:solidFill>
           <a:schemeClr val="tx1"/>
         </a:solidFill>
@@ -66,8 +66,8 @@
         <a:cs typeface="+mn-cs"/>
       </a:defRPr>
     </a:lvl5pPr>
-    <a:lvl6pPr marL="3200400" algn="l" defTabSz="1280160" rtl="0" eaLnBrk="1" latinLnBrk="0" hangingPunct="1">
-      <a:defRPr sz="2520" kern="1200">
+    <a:lvl6pPr marL="2394539" algn="l" defTabSz="957816" rtl="0" eaLnBrk="1" latinLnBrk="0" hangingPunct="1">
+      <a:defRPr sz="1885" kern="1200">
         <a:solidFill>
           <a:schemeClr val="tx1"/>
         </a:solidFill>
@@ -76,8 +76,8 @@
         <a:cs typeface="+mn-cs"/>
       </a:defRPr>
     </a:lvl6pPr>
-    <a:lvl7pPr marL="3840480" algn="l" defTabSz="1280160" rtl="0" eaLnBrk="1" latinLnBrk="0" hangingPunct="1">
-      <a:defRPr sz="2520" kern="1200">
+    <a:lvl7pPr marL="2873447" algn="l" defTabSz="957816" rtl="0" eaLnBrk="1" latinLnBrk="0" hangingPunct="1">
+      <a:defRPr sz="1885" kern="1200">
         <a:solidFill>
           <a:schemeClr val="tx1"/>
         </a:solidFill>
@@ -86,8 +86,8 @@
         <a:cs typeface="+mn-cs"/>
       </a:defRPr>
     </a:lvl7pPr>
-    <a:lvl8pPr marL="4480560" algn="l" defTabSz="1280160" rtl="0" eaLnBrk="1" latinLnBrk="0" hangingPunct="1">
-      <a:defRPr sz="2520" kern="1200">
+    <a:lvl8pPr marL="3352355" algn="l" defTabSz="957816" rtl="0" eaLnBrk="1" latinLnBrk="0" hangingPunct="1">
+      <a:defRPr sz="1885" kern="1200">
         <a:solidFill>
           <a:schemeClr val="tx1"/>
         </a:solidFill>
@@ -96,8 +96,8 @@
         <a:cs typeface="+mn-cs"/>
       </a:defRPr>
     </a:lvl8pPr>
-    <a:lvl9pPr marL="5120640" algn="l" defTabSz="1280160" rtl="0" eaLnBrk="1" latinLnBrk="0" hangingPunct="1">
-      <a:defRPr sz="2520" kern="1200">
+    <a:lvl9pPr marL="3831263" algn="l" defTabSz="957816" rtl="0" eaLnBrk="1" latinLnBrk="0" hangingPunct="1">
+      <a:defRPr sz="1885" kern="1200">
         <a:solidFill>
           <a:schemeClr val="tx1"/>
         </a:solidFill>
@@ -110,12 +110,12 @@
   <p:extLst>
     <p:ext uri="{EFAFB233-063F-42B5-8137-9DF3F51BA10A}">
       <p15:sldGuideLst xmlns:p15="http://schemas.microsoft.com/office/powerpoint/2012/main">
-        <p15:guide id="1" orient="horz" pos="4032" userDrawn="1">
+        <p15:guide id="1" orient="horz" pos="3120" userDrawn="1">
           <p15:clr>
             <a:srgbClr val="A4A3A4"/>
           </p15:clr>
         </p15:guide>
-        <p15:guide id="2" pos="3024" userDrawn="1">
+        <p15:guide id="2" pos="2160" userDrawn="1">
           <p15:clr>
             <a:srgbClr val="A4A3A4"/>
           </p15:clr>
@@ -155,8 +155,8 @@
         </p:nvSpPr>
         <p:spPr>
           <a:xfrm>
-            <a:off x="720090" y="3976794"/>
-            <a:ext cx="8161020" cy="2744047"/>
+            <a:off x="514350" y="3077281"/>
+            <a:ext cx="5829300" cy="2123370"/>
           </a:xfrm>
         </p:spPr>
         <p:txBody>
@@ -183,8 +183,8 @@
         </p:nvSpPr>
         <p:spPr>
           <a:xfrm>
-            <a:off x="1440180" y="7254240"/>
-            <a:ext cx="6720840" cy="3271520"/>
+            <a:off x="1028700" y="5613400"/>
+            <a:ext cx="4800600" cy="2531533"/>
           </a:xfrm>
         </p:spPr>
         <p:txBody>
@@ -200,7 +200,7 @@
                 </a:solidFill>
               </a:defRPr>
             </a:lvl1pPr>
-            <a:lvl2pPr marL="480060" indent="0" algn="ctr">
+            <a:lvl2pPr marL="342907" indent="0" algn="ctr">
               <a:buNone/>
               <a:defRPr>
                 <a:solidFill>
@@ -210,7 +210,7 @@
                 </a:solidFill>
               </a:defRPr>
             </a:lvl2pPr>
-            <a:lvl3pPr marL="960120" indent="0" algn="ctr">
+            <a:lvl3pPr marL="685814" indent="0" algn="ctr">
               <a:buNone/>
               <a:defRPr>
                 <a:solidFill>
@@ -220,7 +220,7 @@
                 </a:solidFill>
               </a:defRPr>
             </a:lvl3pPr>
-            <a:lvl4pPr marL="1440180" indent="0" algn="ctr">
+            <a:lvl4pPr marL="1028721" indent="0" algn="ctr">
               <a:buNone/>
               <a:defRPr>
                 <a:solidFill>
@@ -230,7 +230,7 @@
                 </a:solidFill>
               </a:defRPr>
             </a:lvl4pPr>
-            <a:lvl5pPr marL="1920240" indent="0" algn="ctr">
+            <a:lvl5pPr marL="1371627" indent="0" algn="ctr">
               <a:buNone/>
               <a:defRPr>
                 <a:solidFill>
@@ -240,7 +240,7 @@
                 </a:solidFill>
               </a:defRPr>
             </a:lvl5pPr>
-            <a:lvl6pPr marL="2400300" indent="0" algn="ctr">
+            <a:lvl6pPr marL="1714534" indent="0" algn="ctr">
               <a:buNone/>
               <a:defRPr>
                 <a:solidFill>
@@ -250,7 +250,7 @@
                 </a:solidFill>
               </a:defRPr>
             </a:lvl6pPr>
-            <a:lvl7pPr marL="2880360" indent="0" algn="ctr">
+            <a:lvl7pPr marL="2057441" indent="0" algn="ctr">
               <a:buNone/>
               <a:defRPr>
                 <a:solidFill>
@@ -260,7 +260,7 @@
                 </a:solidFill>
               </a:defRPr>
             </a:lvl7pPr>
-            <a:lvl8pPr marL="3360420" indent="0" algn="ctr">
+            <a:lvl8pPr marL="2400348" indent="0" algn="ctr">
               <a:buNone/>
               <a:defRPr>
                 <a:solidFill>
@@ -270,7 +270,7 @@
                 </a:solidFill>
               </a:defRPr>
             </a:lvl8pPr>
-            <a:lvl9pPr marL="3840480" indent="0" algn="ctr">
+            <a:lvl9pPr marL="2743255" indent="0" algn="ctr">
               <a:buNone/>
               <a:defRPr>
                 <a:solidFill>
@@ -307,7 +307,7 @@
           <a:p>
             <a:fld id="{E6744CE3-0875-4B69-89C0-6F72D8139561}" type="datetimeFigureOut">
               <a:rPr lang="en-GB" smtClean="0"/>
-              <a:t>19/03/2022</a:t>
+              <a:t>11/05/2022</a:t>
             </a:fld>
             <a:endParaRPr lang="en-GB"/>
           </a:p>
@@ -477,7 +477,7 @@
           <a:p>
             <a:fld id="{E6744CE3-0875-4B69-89C0-6F72D8139561}" type="datetimeFigureOut">
               <a:rPr lang="en-GB" smtClean="0"/>
-              <a:t>19/03/2022</a:t>
+              <a:t>11/05/2022</a:t>
             </a:fld>
             <a:endParaRPr lang="en-GB"/>
           </a:p>
@@ -567,15 +567,15 @@
         </p:nvSpPr>
         <p:spPr>
           <a:xfrm>
-            <a:off x="758429" y="8226214"/>
-            <a:ext cx="8161020" cy="2542540"/>
+            <a:off x="541735" y="6365523"/>
+            <a:ext cx="5829300" cy="1967442"/>
           </a:xfrm>
         </p:spPr>
         <p:txBody>
           <a:bodyPr anchor="t"/>
           <a:lstStyle>
             <a:lvl1pPr algn="l">
-              <a:defRPr sz="4200" b="1" cap="all"/>
+              <a:defRPr sz="3000" b="1" cap="all"/>
             </a:lvl1pPr>
           </a:lstStyle>
           <a:p>
@@ -599,8 +599,8 @@
         </p:nvSpPr>
         <p:spPr>
           <a:xfrm>
-            <a:off x="758429" y="5425865"/>
-            <a:ext cx="8161020" cy="2800349"/>
+            <a:off x="541735" y="4198586"/>
+            <a:ext cx="5829300" cy="2166937"/>
           </a:xfrm>
         </p:spPr>
         <p:txBody>
@@ -608,7 +608,7 @@
           <a:lstStyle>
             <a:lvl1pPr marL="0" indent="0">
               <a:buNone/>
-              <a:defRPr sz="2100">
+              <a:defRPr sz="1500">
                 <a:solidFill>
                   <a:schemeClr val="tx1">
                     <a:tint val="75000"/>
@@ -616,9 +616,9 @@
                 </a:solidFill>
               </a:defRPr>
             </a:lvl1pPr>
-            <a:lvl2pPr marL="480060" indent="0">
-              <a:buNone/>
-              <a:defRPr sz="1890">
+            <a:lvl2pPr marL="342907" indent="0">
+              <a:buNone/>
+              <a:defRPr sz="1350">
                 <a:solidFill>
                   <a:schemeClr val="tx1">
                     <a:tint val="75000"/>
@@ -626,9 +626,9 @@
                 </a:solidFill>
               </a:defRPr>
             </a:lvl2pPr>
-            <a:lvl3pPr marL="960120" indent="0">
-              <a:buNone/>
-              <a:defRPr sz="1680">
+            <a:lvl3pPr marL="685814" indent="0">
+              <a:buNone/>
+              <a:defRPr sz="1200">
                 <a:solidFill>
                   <a:schemeClr val="tx1">
                     <a:tint val="75000"/>
@@ -636,9 +636,9 @@
                 </a:solidFill>
               </a:defRPr>
             </a:lvl3pPr>
-            <a:lvl4pPr marL="1440180" indent="0">
-              <a:buNone/>
-              <a:defRPr sz="1470">
+            <a:lvl4pPr marL="1028721" indent="0">
+              <a:buNone/>
+              <a:defRPr sz="1050">
                 <a:solidFill>
                   <a:schemeClr val="tx1">
                     <a:tint val="75000"/>
@@ -646,9 +646,9 @@
                 </a:solidFill>
               </a:defRPr>
             </a:lvl4pPr>
-            <a:lvl5pPr marL="1920240" indent="0">
-              <a:buNone/>
-              <a:defRPr sz="1470">
+            <a:lvl5pPr marL="1371627" indent="0">
+              <a:buNone/>
+              <a:defRPr sz="1050">
                 <a:solidFill>
                   <a:schemeClr val="tx1">
                     <a:tint val="75000"/>
@@ -656,9 +656,9 @@
                 </a:solidFill>
               </a:defRPr>
             </a:lvl5pPr>
-            <a:lvl6pPr marL="2400300" indent="0">
-              <a:buNone/>
-              <a:defRPr sz="1470">
+            <a:lvl6pPr marL="1714534" indent="0">
+              <a:buNone/>
+              <a:defRPr sz="1050">
                 <a:solidFill>
                   <a:schemeClr val="tx1">
                     <a:tint val="75000"/>
@@ -666,9 +666,9 @@
                 </a:solidFill>
               </a:defRPr>
             </a:lvl6pPr>
-            <a:lvl7pPr marL="2880360" indent="0">
-              <a:buNone/>
-              <a:defRPr sz="1470">
+            <a:lvl7pPr marL="2057441" indent="0">
+              <a:buNone/>
+              <a:defRPr sz="1050">
                 <a:solidFill>
                   <a:schemeClr val="tx1">
                     <a:tint val="75000"/>
@@ -676,9 +676,9 @@
                 </a:solidFill>
               </a:defRPr>
             </a:lvl7pPr>
-            <a:lvl8pPr marL="3360420" indent="0">
-              <a:buNone/>
-              <a:defRPr sz="1470">
+            <a:lvl8pPr marL="2400348" indent="0">
+              <a:buNone/>
+              <a:defRPr sz="1050">
                 <a:solidFill>
                   <a:schemeClr val="tx1">
                     <a:tint val="75000"/>
@@ -686,9 +686,9 @@
                 </a:solidFill>
               </a:defRPr>
             </a:lvl8pPr>
-            <a:lvl9pPr marL="3840480" indent="0">
-              <a:buNone/>
-              <a:defRPr sz="1470">
+            <a:lvl9pPr marL="2743255" indent="0">
+              <a:buNone/>
+              <a:defRPr sz="1050">
                 <a:solidFill>
                   <a:schemeClr val="tx1">
                     <a:tint val="75000"/>
@@ -723,7 +723,7 @@
           <a:p>
             <a:fld id="{E6744CE3-0875-4B69-89C0-6F72D8139561}" type="datetimeFigureOut">
               <a:rPr lang="en-GB" smtClean="0"/>
-              <a:t>19/03/2022</a:t>
+              <a:t>11/05/2022</a:t>
             </a:fld>
             <a:endParaRPr lang="en-GB"/>
           </a:p>
@@ -836,39 +836,39 @@
         </p:nvSpPr>
         <p:spPr>
           <a:xfrm>
-            <a:off x="480060" y="2987041"/>
-            <a:ext cx="4240530" cy="8448464"/>
+            <a:off x="342900" y="2311401"/>
+            <a:ext cx="3028950" cy="6537502"/>
           </a:xfrm>
         </p:spPr>
         <p:txBody>
           <a:bodyPr/>
           <a:lstStyle>
             <a:lvl1pPr>
-              <a:defRPr sz="2940"/>
+              <a:defRPr sz="2100"/>
             </a:lvl1pPr>
             <a:lvl2pPr>
-              <a:defRPr sz="2520"/>
+              <a:defRPr sz="1800"/>
             </a:lvl2pPr>
             <a:lvl3pPr>
-              <a:defRPr sz="2100"/>
+              <a:defRPr sz="1500"/>
             </a:lvl3pPr>
             <a:lvl4pPr>
-              <a:defRPr sz="1890"/>
+              <a:defRPr sz="1350"/>
             </a:lvl4pPr>
             <a:lvl5pPr>
-              <a:defRPr sz="1890"/>
+              <a:defRPr sz="1350"/>
             </a:lvl5pPr>
             <a:lvl6pPr>
-              <a:defRPr sz="1890"/>
+              <a:defRPr sz="1350"/>
             </a:lvl6pPr>
             <a:lvl7pPr>
-              <a:defRPr sz="1890"/>
+              <a:defRPr sz="1350"/>
             </a:lvl7pPr>
             <a:lvl8pPr>
-              <a:defRPr sz="1890"/>
+              <a:defRPr sz="1350"/>
             </a:lvl8pPr>
             <a:lvl9pPr>
-              <a:defRPr sz="1890"/>
+              <a:defRPr sz="1350"/>
             </a:lvl9pPr>
           </a:lstStyle>
           <a:p>
@@ -921,39 +921,39 @@
         </p:nvSpPr>
         <p:spPr>
           <a:xfrm>
-            <a:off x="4880610" y="2987041"/>
-            <a:ext cx="4240530" cy="8448464"/>
+            <a:off x="3486150" y="2311401"/>
+            <a:ext cx="3028950" cy="6537502"/>
           </a:xfrm>
         </p:spPr>
         <p:txBody>
           <a:bodyPr/>
           <a:lstStyle>
             <a:lvl1pPr>
-              <a:defRPr sz="2940"/>
+              <a:defRPr sz="2100"/>
             </a:lvl1pPr>
             <a:lvl2pPr>
-              <a:defRPr sz="2520"/>
+              <a:defRPr sz="1800"/>
             </a:lvl2pPr>
             <a:lvl3pPr>
-              <a:defRPr sz="2100"/>
+              <a:defRPr sz="1500"/>
             </a:lvl3pPr>
             <a:lvl4pPr>
-              <a:defRPr sz="1890"/>
+              <a:defRPr sz="1350"/>
             </a:lvl4pPr>
             <a:lvl5pPr>
-              <a:defRPr sz="1890"/>
+              <a:defRPr sz="1350"/>
             </a:lvl5pPr>
             <a:lvl6pPr>
-              <a:defRPr sz="1890"/>
+              <a:defRPr sz="1350"/>
             </a:lvl6pPr>
             <a:lvl7pPr>
-              <a:defRPr sz="1890"/>
+              <a:defRPr sz="1350"/>
             </a:lvl7pPr>
             <a:lvl8pPr>
-              <a:defRPr sz="1890"/>
+              <a:defRPr sz="1350"/>
             </a:lvl8pPr>
             <a:lvl9pPr>
-              <a:defRPr sz="1890"/>
+              <a:defRPr sz="1350"/>
             </a:lvl9pPr>
           </a:lstStyle>
           <a:p>
@@ -1011,7 +1011,7 @@
           <a:p>
             <a:fld id="{E6744CE3-0875-4B69-89C0-6F72D8139561}" type="datetimeFigureOut">
               <a:rPr lang="en-GB" smtClean="0"/>
-              <a:t>19/03/2022</a:t>
+              <a:t>11/05/2022</a:t>
             </a:fld>
             <a:endParaRPr lang="en-GB"/>
           </a:p>
@@ -1128,8 +1128,8 @@
         </p:nvSpPr>
         <p:spPr>
           <a:xfrm>
-            <a:off x="480060" y="2865544"/>
-            <a:ext cx="4242197" cy="1194222"/>
+            <a:off x="342900" y="2217385"/>
+            <a:ext cx="3030141" cy="924100"/>
           </a:xfrm>
         </p:spPr>
         <p:txBody>
@@ -1137,39 +1137,39 @@
           <a:lstStyle>
             <a:lvl1pPr marL="0" indent="0">
               <a:buNone/>
-              <a:defRPr sz="2520" b="1"/>
+              <a:defRPr sz="1800" b="1"/>
             </a:lvl1pPr>
-            <a:lvl2pPr marL="480060" indent="0">
-              <a:buNone/>
-              <a:defRPr sz="2100" b="1"/>
+            <a:lvl2pPr marL="342907" indent="0">
+              <a:buNone/>
+              <a:defRPr sz="1500" b="1"/>
             </a:lvl2pPr>
-            <a:lvl3pPr marL="960120" indent="0">
-              <a:buNone/>
-              <a:defRPr sz="1890" b="1"/>
+            <a:lvl3pPr marL="685814" indent="0">
+              <a:buNone/>
+              <a:defRPr sz="1350" b="1"/>
             </a:lvl3pPr>
-            <a:lvl4pPr marL="1440180" indent="0">
-              <a:buNone/>
-              <a:defRPr sz="1680" b="1"/>
+            <a:lvl4pPr marL="1028721" indent="0">
+              <a:buNone/>
+              <a:defRPr sz="1200" b="1"/>
             </a:lvl4pPr>
-            <a:lvl5pPr marL="1920240" indent="0">
-              <a:buNone/>
-              <a:defRPr sz="1680" b="1"/>
+            <a:lvl5pPr marL="1371627" indent="0">
+              <a:buNone/>
+              <a:defRPr sz="1200" b="1"/>
             </a:lvl5pPr>
-            <a:lvl6pPr marL="2400300" indent="0">
-              <a:buNone/>
-              <a:defRPr sz="1680" b="1"/>
+            <a:lvl6pPr marL="1714534" indent="0">
+              <a:buNone/>
+              <a:defRPr sz="1200" b="1"/>
             </a:lvl6pPr>
-            <a:lvl7pPr marL="2880360" indent="0">
-              <a:buNone/>
-              <a:defRPr sz="1680" b="1"/>
+            <a:lvl7pPr marL="2057441" indent="0">
+              <a:buNone/>
+              <a:defRPr sz="1200" b="1"/>
             </a:lvl7pPr>
-            <a:lvl8pPr marL="3360420" indent="0">
-              <a:buNone/>
-              <a:defRPr sz="1680" b="1"/>
+            <a:lvl8pPr marL="2400348" indent="0">
+              <a:buNone/>
+              <a:defRPr sz="1200" b="1"/>
             </a:lvl8pPr>
-            <a:lvl9pPr marL="3840480" indent="0">
-              <a:buNone/>
-              <a:defRPr sz="1680" b="1"/>
+            <a:lvl9pPr marL="2743255" indent="0">
+              <a:buNone/>
+              <a:defRPr sz="1200" b="1"/>
             </a:lvl9pPr>
           </a:lstStyle>
           <a:p>
@@ -1193,39 +1193,39 @@
         </p:nvSpPr>
         <p:spPr>
           <a:xfrm>
-            <a:off x="480060" y="4059766"/>
-            <a:ext cx="4242197" cy="7375738"/>
+            <a:off x="342900" y="3141486"/>
+            <a:ext cx="3030141" cy="5707416"/>
           </a:xfrm>
         </p:spPr>
         <p:txBody>
           <a:bodyPr/>
           <a:lstStyle>
             <a:lvl1pPr>
-              <a:defRPr sz="2520"/>
+              <a:defRPr sz="1800"/>
             </a:lvl1pPr>
             <a:lvl2pPr>
-              <a:defRPr sz="2100"/>
+              <a:defRPr sz="1500"/>
             </a:lvl2pPr>
             <a:lvl3pPr>
-              <a:defRPr sz="1890"/>
+              <a:defRPr sz="1350"/>
             </a:lvl3pPr>
             <a:lvl4pPr>
-              <a:defRPr sz="1680"/>
+              <a:defRPr sz="1200"/>
             </a:lvl4pPr>
             <a:lvl5pPr>
-              <a:defRPr sz="1680"/>
+              <a:defRPr sz="1200"/>
             </a:lvl5pPr>
             <a:lvl6pPr>
-              <a:defRPr sz="1680"/>
+              <a:defRPr sz="1200"/>
             </a:lvl6pPr>
             <a:lvl7pPr>
-              <a:defRPr sz="1680"/>
+              <a:defRPr sz="1200"/>
             </a:lvl7pPr>
             <a:lvl8pPr>
-              <a:defRPr sz="1680"/>
+              <a:defRPr sz="1200"/>
             </a:lvl8pPr>
             <a:lvl9pPr>
-              <a:defRPr sz="1680"/>
+              <a:defRPr sz="1200"/>
             </a:lvl9pPr>
           </a:lstStyle>
           <a:p>
@@ -1278,8 +1278,8 @@
         </p:nvSpPr>
         <p:spPr>
           <a:xfrm>
-            <a:off x="4877277" y="2865544"/>
-            <a:ext cx="4243864" cy="1194222"/>
+            <a:off x="3483770" y="2217385"/>
+            <a:ext cx="3031331" cy="924100"/>
           </a:xfrm>
         </p:spPr>
         <p:txBody>
@@ -1287,39 +1287,39 @@
           <a:lstStyle>
             <a:lvl1pPr marL="0" indent="0">
               <a:buNone/>
-              <a:defRPr sz="2520" b="1"/>
+              <a:defRPr sz="1800" b="1"/>
             </a:lvl1pPr>
-            <a:lvl2pPr marL="480060" indent="0">
-              <a:buNone/>
-              <a:defRPr sz="2100" b="1"/>
+            <a:lvl2pPr marL="342907" indent="0">
+              <a:buNone/>
+              <a:defRPr sz="1500" b="1"/>
             </a:lvl2pPr>
-            <a:lvl3pPr marL="960120" indent="0">
-              <a:buNone/>
-              <a:defRPr sz="1890" b="1"/>
+            <a:lvl3pPr marL="685814" indent="0">
+              <a:buNone/>
+              <a:defRPr sz="1350" b="1"/>
             </a:lvl3pPr>
-            <a:lvl4pPr marL="1440180" indent="0">
-              <a:buNone/>
-              <a:defRPr sz="1680" b="1"/>
+            <a:lvl4pPr marL="1028721" indent="0">
+              <a:buNone/>
+              <a:defRPr sz="1200" b="1"/>
             </a:lvl4pPr>
-            <a:lvl5pPr marL="1920240" indent="0">
-              <a:buNone/>
-              <a:defRPr sz="1680" b="1"/>
+            <a:lvl5pPr marL="1371627" indent="0">
+              <a:buNone/>
+              <a:defRPr sz="1200" b="1"/>
             </a:lvl5pPr>
-            <a:lvl6pPr marL="2400300" indent="0">
-              <a:buNone/>
-              <a:defRPr sz="1680" b="1"/>
+            <a:lvl6pPr marL="1714534" indent="0">
+              <a:buNone/>
+              <a:defRPr sz="1200" b="1"/>
             </a:lvl6pPr>
-            <a:lvl7pPr marL="2880360" indent="0">
-              <a:buNone/>
-              <a:defRPr sz="1680" b="1"/>
+            <a:lvl7pPr marL="2057441" indent="0">
+              <a:buNone/>
+              <a:defRPr sz="1200" b="1"/>
             </a:lvl7pPr>
-            <a:lvl8pPr marL="3360420" indent="0">
-              <a:buNone/>
-              <a:defRPr sz="1680" b="1"/>
+            <a:lvl8pPr marL="2400348" indent="0">
+              <a:buNone/>
+              <a:defRPr sz="1200" b="1"/>
             </a:lvl8pPr>
-            <a:lvl9pPr marL="3840480" indent="0">
-              <a:buNone/>
-              <a:defRPr sz="1680" b="1"/>
+            <a:lvl9pPr marL="2743255" indent="0">
+              <a:buNone/>
+              <a:defRPr sz="1200" b="1"/>
             </a:lvl9pPr>
           </a:lstStyle>
           <a:p>
@@ -1343,39 +1343,39 @@
         </p:nvSpPr>
         <p:spPr>
           <a:xfrm>
-            <a:off x="4877277" y="4059766"/>
-            <a:ext cx="4243864" cy="7375738"/>
+            <a:off x="3483770" y="3141486"/>
+            <a:ext cx="3031331" cy="5707416"/>
           </a:xfrm>
         </p:spPr>
         <p:txBody>
           <a:bodyPr/>
           <a:lstStyle>
             <a:lvl1pPr>
-              <a:defRPr sz="2520"/>
+              <a:defRPr sz="1800"/>
             </a:lvl1pPr>
             <a:lvl2pPr>
-              <a:defRPr sz="2100"/>
+              <a:defRPr sz="1500"/>
             </a:lvl2pPr>
             <a:lvl3pPr>
-              <a:defRPr sz="1890"/>
+              <a:defRPr sz="1350"/>
             </a:lvl3pPr>
             <a:lvl4pPr>
-              <a:defRPr sz="1680"/>
+              <a:defRPr sz="1200"/>
             </a:lvl4pPr>
             <a:lvl5pPr>
-              <a:defRPr sz="1680"/>
+              <a:defRPr sz="1200"/>
             </a:lvl5pPr>
             <a:lvl6pPr>
-              <a:defRPr sz="1680"/>
+              <a:defRPr sz="1200"/>
             </a:lvl6pPr>
             <a:lvl7pPr>
-              <a:defRPr sz="1680"/>
+              <a:defRPr sz="1200"/>
             </a:lvl7pPr>
             <a:lvl8pPr>
-              <a:defRPr sz="1680"/>
+              <a:defRPr sz="1200"/>
             </a:lvl8pPr>
             <a:lvl9pPr>
-              <a:defRPr sz="1680"/>
+              <a:defRPr sz="1200"/>
             </a:lvl9pPr>
           </a:lstStyle>
           <a:p>
@@ -1433,7 +1433,7 @@
           <a:p>
             <a:fld id="{E6744CE3-0875-4B69-89C0-6F72D8139561}" type="datetimeFigureOut">
               <a:rPr lang="en-GB" smtClean="0"/>
-              <a:t>19/03/2022</a:t>
+              <a:t>11/05/2022</a:t>
             </a:fld>
             <a:endParaRPr lang="en-GB"/>
           </a:p>
@@ -1551,7 +1551,7 @@
           <a:p>
             <a:fld id="{E6744CE3-0875-4B69-89C0-6F72D8139561}" type="datetimeFigureOut">
               <a:rPr lang="en-GB" smtClean="0"/>
-              <a:t>19/03/2022</a:t>
+              <a:t>11/05/2022</a:t>
             </a:fld>
             <a:endParaRPr lang="en-GB"/>
           </a:p>
@@ -1646,7 +1646,7 @@
           <a:p>
             <a:fld id="{E6744CE3-0875-4B69-89C0-6F72D8139561}" type="datetimeFigureOut">
               <a:rPr lang="en-GB" smtClean="0"/>
-              <a:t>19/03/2022</a:t>
+              <a:t>11/05/2022</a:t>
             </a:fld>
             <a:endParaRPr lang="en-GB"/>
           </a:p>
@@ -1741,8 +1741,8 @@
         </p:nvSpPr>
         <p:spPr>
           <a:xfrm>
-            <a:off x="480060" y="512658"/>
-            <a:ext cx="8641080" cy="2133600"/>
+            <a:off x="342900" y="396700"/>
+            <a:ext cx="6172200" cy="1651000"/>
           </a:xfrm>
           <a:prstGeom prst="rect">
             <a:avLst/>
@@ -1774,8 +1774,8 @@
         </p:nvSpPr>
         <p:spPr>
           <a:xfrm>
-            <a:off x="480060" y="2987041"/>
-            <a:ext cx="8641080" cy="8448464"/>
+            <a:off x="342900" y="2311401"/>
+            <a:ext cx="6172200" cy="6537502"/>
           </a:xfrm>
           <a:prstGeom prst="rect">
             <a:avLst/>
@@ -1836,8 +1836,8 @@
         </p:nvSpPr>
         <p:spPr>
           <a:xfrm>
-            <a:off x="480060" y="11865187"/>
-            <a:ext cx="2240280" cy="681567"/>
+            <a:off x="342900" y="9181395"/>
+            <a:ext cx="1600200" cy="527403"/>
           </a:xfrm>
           <a:prstGeom prst="rect">
             <a:avLst/>
@@ -1847,7 +1847,7 @@
           <a:bodyPr vert="horz" lIns="91440" tIns="45720" rIns="91440" bIns="45720" rtlCol="0" anchor="ctr"/>
           <a:lstStyle>
             <a:lvl1pPr algn="l">
-              <a:defRPr sz="1260">
+              <a:defRPr sz="900">
                 <a:solidFill>
                   <a:schemeClr val="tx1">
                     <a:tint val="75000"/>
@@ -1859,7 +1859,7 @@
           <a:p>
             <a:fld id="{E6744CE3-0875-4B69-89C0-6F72D8139561}" type="datetimeFigureOut">
               <a:rPr lang="en-GB" smtClean="0"/>
-              <a:t>19/03/2022</a:t>
+              <a:t>11/05/2022</a:t>
             </a:fld>
             <a:endParaRPr lang="en-GB"/>
           </a:p>
@@ -1877,8 +1877,8 @@
         </p:nvSpPr>
         <p:spPr>
           <a:xfrm>
-            <a:off x="3280410" y="11865187"/>
-            <a:ext cx="3040380" cy="681567"/>
+            <a:off x="2343150" y="9181395"/>
+            <a:ext cx="2171700" cy="527403"/>
           </a:xfrm>
           <a:prstGeom prst="rect">
             <a:avLst/>
@@ -1888,7 +1888,7 @@
           <a:bodyPr vert="horz" lIns="91440" tIns="45720" rIns="91440" bIns="45720" rtlCol="0" anchor="ctr"/>
           <a:lstStyle>
             <a:lvl1pPr algn="ctr">
-              <a:defRPr sz="1260">
+              <a:defRPr sz="900">
                 <a:solidFill>
                   <a:schemeClr val="tx1">
                     <a:tint val="75000"/>
@@ -1914,8 +1914,8 @@
         </p:nvSpPr>
         <p:spPr>
           <a:xfrm>
-            <a:off x="6880860" y="11865187"/>
-            <a:ext cx="2240280" cy="681567"/>
+            <a:off x="4914900" y="9181395"/>
+            <a:ext cx="1600200" cy="527403"/>
           </a:xfrm>
           <a:prstGeom prst="rect">
             <a:avLst/>
@@ -1925,7 +1925,7 @@
           <a:bodyPr vert="horz" lIns="91440" tIns="45720" rIns="91440" bIns="45720" rtlCol="0" anchor="ctr"/>
           <a:lstStyle>
             <a:lvl1pPr algn="r">
-              <a:defRPr sz="1260">
+              <a:defRPr sz="900">
                 <a:solidFill>
                   <a:schemeClr val="tx1">
                     <a:tint val="75000"/>
@@ -1962,12 +1962,12 @@
   </p:sldLayoutIdLst>
   <p:txStyles>
     <p:titleStyle>
-      <a:lvl1pPr algn="ctr" defTabSz="960120" rtl="0" eaLnBrk="1" latinLnBrk="0" hangingPunct="1">
+      <a:lvl1pPr algn="ctr" defTabSz="685814" rtl="0" eaLnBrk="1" latinLnBrk="0" hangingPunct="1">
         <a:spcBef>
           <a:spcPct val="0"/>
         </a:spcBef>
         <a:buNone/>
-        <a:defRPr sz="4620" kern="1200">
+        <a:defRPr sz="3300" kern="1200">
           <a:solidFill>
             <a:schemeClr val="tx1"/>
           </a:solidFill>
@@ -1978,13 +1978,13 @@
       </a:lvl1pPr>
     </p:titleStyle>
     <p:bodyStyle>
-      <a:lvl1pPr marL="360045" indent="-360045" algn="l" defTabSz="960120" rtl="0" eaLnBrk="1" latinLnBrk="0" hangingPunct="1">
+      <a:lvl1pPr marL="257180" indent="-257180" algn="l" defTabSz="685814" rtl="0" eaLnBrk="1" latinLnBrk="0" hangingPunct="1">
         <a:spcBef>
           <a:spcPct val="20000"/>
         </a:spcBef>
         <a:buFont typeface="Arial" panose="020B0604020202020204" pitchFamily="34" charset="0"/>
         <a:buChar char="•"/>
-        <a:defRPr sz="3360" kern="1200">
+        <a:defRPr sz="2400" kern="1200">
           <a:solidFill>
             <a:schemeClr val="tx1"/>
           </a:solidFill>
@@ -1993,37 +1993,7 @@
           <a:cs typeface="+mn-cs"/>
         </a:defRPr>
       </a:lvl1pPr>
-      <a:lvl2pPr marL="780098" indent="-300038" algn="l" defTabSz="960120" rtl="0" eaLnBrk="1" latinLnBrk="0" hangingPunct="1">
-        <a:spcBef>
-          <a:spcPct val="20000"/>
-        </a:spcBef>
-        <a:buFont typeface="Arial" panose="020B0604020202020204" pitchFamily="34" charset="0"/>
-        <a:buChar char="–"/>
-        <a:defRPr sz="2940" kern="1200">
-          <a:solidFill>
-            <a:schemeClr val="tx1"/>
-          </a:solidFill>
-          <a:latin typeface="+mn-lt"/>
-          <a:ea typeface="+mn-ea"/>
-          <a:cs typeface="+mn-cs"/>
-        </a:defRPr>
-      </a:lvl2pPr>
-      <a:lvl3pPr marL="1200150" indent="-240030" algn="l" defTabSz="960120" rtl="0" eaLnBrk="1" latinLnBrk="0" hangingPunct="1">
-        <a:spcBef>
-          <a:spcPct val="20000"/>
-        </a:spcBef>
-        <a:buFont typeface="Arial" panose="020B0604020202020204" pitchFamily="34" charset="0"/>
-        <a:buChar char="•"/>
-        <a:defRPr sz="2520" kern="1200">
-          <a:solidFill>
-            <a:schemeClr val="tx1"/>
-          </a:solidFill>
-          <a:latin typeface="+mn-lt"/>
-          <a:ea typeface="+mn-ea"/>
-          <a:cs typeface="+mn-cs"/>
-        </a:defRPr>
-      </a:lvl3pPr>
-      <a:lvl4pPr marL="1680210" indent="-240030" algn="l" defTabSz="960120" rtl="0" eaLnBrk="1" latinLnBrk="0" hangingPunct="1">
+      <a:lvl2pPr marL="557224" indent="-214317" algn="l" defTabSz="685814" rtl="0" eaLnBrk="1" latinLnBrk="0" hangingPunct="1">
         <a:spcBef>
           <a:spcPct val="20000"/>
         </a:spcBef>
@@ -2037,14 +2007,44 @@
           <a:ea typeface="+mn-ea"/>
           <a:cs typeface="+mn-cs"/>
         </a:defRPr>
+      </a:lvl2pPr>
+      <a:lvl3pPr marL="857267" indent="-171453" algn="l" defTabSz="685814" rtl="0" eaLnBrk="1" latinLnBrk="0" hangingPunct="1">
+        <a:spcBef>
+          <a:spcPct val="20000"/>
+        </a:spcBef>
+        <a:buFont typeface="Arial" panose="020B0604020202020204" pitchFamily="34" charset="0"/>
+        <a:buChar char="•"/>
+        <a:defRPr sz="1800" kern="1200">
+          <a:solidFill>
+            <a:schemeClr val="tx1"/>
+          </a:solidFill>
+          <a:latin typeface="+mn-lt"/>
+          <a:ea typeface="+mn-ea"/>
+          <a:cs typeface="+mn-cs"/>
+        </a:defRPr>
+      </a:lvl3pPr>
+      <a:lvl4pPr marL="1200174" indent="-171453" algn="l" defTabSz="685814" rtl="0" eaLnBrk="1" latinLnBrk="0" hangingPunct="1">
+        <a:spcBef>
+          <a:spcPct val="20000"/>
+        </a:spcBef>
+        <a:buFont typeface="Arial" panose="020B0604020202020204" pitchFamily="34" charset="0"/>
+        <a:buChar char="–"/>
+        <a:defRPr sz="1500" kern="1200">
+          <a:solidFill>
+            <a:schemeClr val="tx1"/>
+          </a:solidFill>
+          <a:latin typeface="+mn-lt"/>
+          <a:ea typeface="+mn-ea"/>
+          <a:cs typeface="+mn-cs"/>
+        </a:defRPr>
       </a:lvl4pPr>
-      <a:lvl5pPr marL="2160270" indent="-240030" algn="l" defTabSz="960120" rtl="0" eaLnBrk="1" latinLnBrk="0" hangingPunct="1">
+      <a:lvl5pPr marL="1543081" indent="-171453" algn="l" defTabSz="685814" rtl="0" eaLnBrk="1" latinLnBrk="0" hangingPunct="1">
         <a:spcBef>
           <a:spcPct val="20000"/>
         </a:spcBef>
         <a:buFont typeface="Arial" panose="020B0604020202020204" pitchFamily="34" charset="0"/>
         <a:buChar char="»"/>
-        <a:defRPr sz="2100" kern="1200">
+        <a:defRPr sz="1500" kern="1200">
           <a:solidFill>
             <a:schemeClr val="tx1"/>
           </a:solidFill>
@@ -2053,13 +2053,13 @@
           <a:cs typeface="+mn-cs"/>
         </a:defRPr>
       </a:lvl5pPr>
-      <a:lvl6pPr marL="2640330" indent="-240030" algn="l" defTabSz="960120" rtl="0" eaLnBrk="1" latinLnBrk="0" hangingPunct="1">
+      <a:lvl6pPr marL="1885988" indent="-171453" algn="l" defTabSz="685814" rtl="0" eaLnBrk="1" latinLnBrk="0" hangingPunct="1">
         <a:spcBef>
           <a:spcPct val="20000"/>
         </a:spcBef>
         <a:buFont typeface="Arial" panose="020B0604020202020204" pitchFamily="34" charset="0"/>
         <a:buChar char="•"/>
-        <a:defRPr sz="2100" kern="1200">
+        <a:defRPr sz="1500" kern="1200">
           <a:solidFill>
             <a:schemeClr val="tx1"/>
           </a:solidFill>
@@ -2068,13 +2068,13 @@
           <a:cs typeface="+mn-cs"/>
         </a:defRPr>
       </a:lvl6pPr>
-      <a:lvl7pPr marL="3120390" indent="-240030" algn="l" defTabSz="960120" rtl="0" eaLnBrk="1" latinLnBrk="0" hangingPunct="1">
+      <a:lvl7pPr marL="2228895" indent="-171453" algn="l" defTabSz="685814" rtl="0" eaLnBrk="1" latinLnBrk="0" hangingPunct="1">
         <a:spcBef>
           <a:spcPct val="20000"/>
         </a:spcBef>
         <a:buFont typeface="Arial" panose="020B0604020202020204" pitchFamily="34" charset="0"/>
         <a:buChar char="•"/>
-        <a:defRPr sz="2100" kern="1200">
+        <a:defRPr sz="1500" kern="1200">
           <a:solidFill>
             <a:schemeClr val="tx1"/>
           </a:solidFill>
@@ -2083,13 +2083,13 @@
           <a:cs typeface="+mn-cs"/>
         </a:defRPr>
       </a:lvl7pPr>
-      <a:lvl8pPr marL="3600450" indent="-240030" algn="l" defTabSz="960120" rtl="0" eaLnBrk="1" latinLnBrk="0" hangingPunct="1">
+      <a:lvl8pPr marL="2571801" indent="-171453" algn="l" defTabSz="685814" rtl="0" eaLnBrk="1" latinLnBrk="0" hangingPunct="1">
         <a:spcBef>
           <a:spcPct val="20000"/>
         </a:spcBef>
         <a:buFont typeface="Arial" panose="020B0604020202020204" pitchFamily="34" charset="0"/>
         <a:buChar char="•"/>
-        <a:defRPr sz="2100" kern="1200">
+        <a:defRPr sz="1500" kern="1200">
           <a:solidFill>
             <a:schemeClr val="tx1"/>
           </a:solidFill>
@@ -2098,13 +2098,13 @@
           <a:cs typeface="+mn-cs"/>
         </a:defRPr>
       </a:lvl8pPr>
-      <a:lvl9pPr marL="4080510" indent="-240030" algn="l" defTabSz="960120" rtl="0" eaLnBrk="1" latinLnBrk="0" hangingPunct="1">
+      <a:lvl9pPr marL="2914708" indent="-171453" algn="l" defTabSz="685814" rtl="0" eaLnBrk="1" latinLnBrk="0" hangingPunct="1">
         <a:spcBef>
           <a:spcPct val="20000"/>
         </a:spcBef>
         <a:buFont typeface="Arial" panose="020B0604020202020204" pitchFamily="34" charset="0"/>
         <a:buChar char="•"/>
-        <a:defRPr sz="2100" kern="1200">
+        <a:defRPr sz="1500" kern="1200">
           <a:solidFill>
             <a:schemeClr val="tx1"/>
           </a:solidFill>
@@ -2118,8 +2118,8 @@
       <a:defPPr>
         <a:defRPr lang="en-US"/>
       </a:defPPr>
-      <a:lvl1pPr marL="0" algn="l" defTabSz="960120" rtl="0" eaLnBrk="1" latinLnBrk="0" hangingPunct="1">
-        <a:defRPr sz="1890" kern="1200">
+      <a:lvl1pPr marL="0" algn="l" defTabSz="685814" rtl="0" eaLnBrk="1" latinLnBrk="0" hangingPunct="1">
+        <a:defRPr sz="1350" kern="1200">
           <a:solidFill>
             <a:schemeClr val="tx1"/>
           </a:solidFill>
@@ -2128,8 +2128,8 @@
           <a:cs typeface="+mn-cs"/>
         </a:defRPr>
       </a:lvl1pPr>
-      <a:lvl2pPr marL="480060" algn="l" defTabSz="960120" rtl="0" eaLnBrk="1" latinLnBrk="0" hangingPunct="1">
-        <a:defRPr sz="1890" kern="1200">
+      <a:lvl2pPr marL="342907" algn="l" defTabSz="685814" rtl="0" eaLnBrk="1" latinLnBrk="0" hangingPunct="1">
+        <a:defRPr sz="1350" kern="1200">
           <a:solidFill>
             <a:schemeClr val="tx1"/>
           </a:solidFill>
@@ -2138,8 +2138,8 @@
           <a:cs typeface="+mn-cs"/>
         </a:defRPr>
       </a:lvl2pPr>
-      <a:lvl3pPr marL="960120" algn="l" defTabSz="960120" rtl="0" eaLnBrk="1" latinLnBrk="0" hangingPunct="1">
-        <a:defRPr sz="1890" kern="1200">
+      <a:lvl3pPr marL="685814" algn="l" defTabSz="685814" rtl="0" eaLnBrk="1" latinLnBrk="0" hangingPunct="1">
+        <a:defRPr sz="1350" kern="1200">
           <a:solidFill>
             <a:schemeClr val="tx1"/>
           </a:solidFill>
@@ -2148,8 +2148,8 @@
           <a:cs typeface="+mn-cs"/>
         </a:defRPr>
       </a:lvl3pPr>
-      <a:lvl4pPr marL="1440180" algn="l" defTabSz="960120" rtl="0" eaLnBrk="1" latinLnBrk="0" hangingPunct="1">
-        <a:defRPr sz="1890" kern="1200">
+      <a:lvl4pPr marL="1028721" algn="l" defTabSz="685814" rtl="0" eaLnBrk="1" latinLnBrk="0" hangingPunct="1">
+        <a:defRPr sz="1350" kern="1200">
           <a:solidFill>
             <a:schemeClr val="tx1"/>
           </a:solidFill>
@@ -2158,8 +2158,8 @@
           <a:cs typeface="+mn-cs"/>
         </a:defRPr>
       </a:lvl4pPr>
-      <a:lvl5pPr marL="1920240" algn="l" defTabSz="960120" rtl="0" eaLnBrk="1" latinLnBrk="0" hangingPunct="1">
-        <a:defRPr sz="1890" kern="1200">
+      <a:lvl5pPr marL="1371627" algn="l" defTabSz="685814" rtl="0" eaLnBrk="1" latinLnBrk="0" hangingPunct="1">
+        <a:defRPr sz="1350" kern="1200">
           <a:solidFill>
             <a:schemeClr val="tx1"/>
           </a:solidFill>
@@ -2168,8 +2168,8 @@
           <a:cs typeface="+mn-cs"/>
         </a:defRPr>
       </a:lvl5pPr>
-      <a:lvl6pPr marL="2400300" algn="l" defTabSz="960120" rtl="0" eaLnBrk="1" latinLnBrk="0" hangingPunct="1">
-        <a:defRPr sz="1890" kern="1200">
+      <a:lvl6pPr marL="1714534" algn="l" defTabSz="685814" rtl="0" eaLnBrk="1" latinLnBrk="0" hangingPunct="1">
+        <a:defRPr sz="1350" kern="1200">
           <a:solidFill>
             <a:schemeClr val="tx1"/>
           </a:solidFill>
@@ -2178,8 +2178,8 @@
           <a:cs typeface="+mn-cs"/>
         </a:defRPr>
       </a:lvl6pPr>
-      <a:lvl7pPr marL="2880360" algn="l" defTabSz="960120" rtl="0" eaLnBrk="1" latinLnBrk="0" hangingPunct="1">
-        <a:defRPr sz="1890" kern="1200">
+      <a:lvl7pPr marL="2057441" algn="l" defTabSz="685814" rtl="0" eaLnBrk="1" latinLnBrk="0" hangingPunct="1">
+        <a:defRPr sz="1350" kern="1200">
           <a:solidFill>
             <a:schemeClr val="tx1"/>
           </a:solidFill>
@@ -2188,8 +2188,8 @@
           <a:cs typeface="+mn-cs"/>
         </a:defRPr>
       </a:lvl7pPr>
-      <a:lvl8pPr marL="3360420" algn="l" defTabSz="960120" rtl="0" eaLnBrk="1" latinLnBrk="0" hangingPunct="1">
-        <a:defRPr sz="1890" kern="1200">
+      <a:lvl8pPr marL="2400348" algn="l" defTabSz="685814" rtl="0" eaLnBrk="1" latinLnBrk="0" hangingPunct="1">
+        <a:defRPr sz="1350" kern="1200">
           <a:solidFill>
             <a:schemeClr val="tx1"/>
           </a:solidFill>
@@ -2198,8 +2198,8 @@
           <a:cs typeface="+mn-cs"/>
         </a:defRPr>
       </a:lvl8pPr>
-      <a:lvl9pPr marL="3840480" algn="l" defTabSz="960120" rtl="0" eaLnBrk="1" latinLnBrk="0" hangingPunct="1">
-        <a:defRPr sz="1890" kern="1200">
+      <a:lvl9pPr marL="2743255" algn="l" defTabSz="685814" rtl="0" eaLnBrk="1" latinLnBrk="0" hangingPunct="1">
+        <a:defRPr sz="1350" kern="1200">
           <a:solidFill>
             <a:schemeClr val="tx1"/>
           </a:solidFill>

</xml_diff>